<commit_message>
fixed typo in w2v3
</commit_message>
<xml_diff>
--- a/materials/w2/W2-V3-synapse-models.pptx
+++ b/materials/w2/W2-V3-synapse-models.pptx
@@ -130,9 +130,8 @@
 <file path=ppt/revisionInfo.xml><?xml version="1.0" encoding="utf-8"?>
 <p1510:revInfo xmlns:a="http://schemas.openxmlformats.org/drawingml/2006/main" xmlns:r="http://schemas.openxmlformats.org/officeDocument/2006/relationships" xmlns:p1510="http://schemas.microsoft.com/office/powerpoint/2015/10/main">
   <p1510:revLst>
-    <p1510:client id="{6E5C6814-6546-43DB-A74A-F8B2F8750933}" v="1657" dt="2023-10-20T18:23:11.180"/>
-    <p1510:client id="{86A15DB7-A6C6-4017-86A4-A976E73D1EAD}" v="17" dt="2023-10-20T10:48:24.131"/>
-    <p1510:client id="{B4BD21C8-3EBA-4CFF-AA71-E6A499ABD6AF}" v="1" dt="2023-10-20T18:42:42.018"/>
+    <p1510:client id="{0E69344F-9CC6-4F12-9DD7-79618EFB4DB5}" v="1" dt="2023-12-12T18:25:37.192"/>
+    <p1510:client id="{30B316B2-9B78-472A-B53B-D93AFCF68998}" v="18" dt="2023-12-12T18:19:49.085"/>
   </p1510:revLst>
 </p1510:revInfo>
 </file>
@@ -402,20 +401,20 @@
     </pc:docChg>
   </pc:docChgLst>
   <pc:docChgLst>
-    <pc:chgData name="Goodman, Daniel F M" userId="3856083d-7deb-434e-baee-35426c02f58e" providerId="ADAL" clId="{B4BD21C8-3EBA-4CFF-AA71-E6A499ABD6AF}"/>
+    <pc:chgData name="Goodman, Daniel F M" userId="3856083d-7deb-434e-baee-35426c02f58e" providerId="ADAL" clId="{0E69344F-9CC6-4F12-9DD7-79618EFB4DB5}"/>
     <pc:docChg chg="modSld">
-      <pc:chgData name="Goodman, Daniel F M" userId="3856083d-7deb-434e-baee-35426c02f58e" providerId="ADAL" clId="{B4BD21C8-3EBA-4CFF-AA71-E6A499ABD6AF}" dt="2023-10-20T18:42:42.018" v="0"/>
+      <pc:chgData name="Goodman, Daniel F M" userId="3856083d-7deb-434e-baee-35426c02f58e" providerId="ADAL" clId="{0E69344F-9CC6-4F12-9DD7-79618EFB4DB5}" dt="2023-12-12T18:25:37.192" v="0"/>
       <pc:docMkLst>
         <pc:docMk/>
       </pc:docMkLst>
       <pc:sldChg chg="modSp modTransition modAnim">
-        <pc:chgData name="Goodman, Daniel F M" userId="3856083d-7deb-434e-baee-35426c02f58e" providerId="ADAL" clId="{B4BD21C8-3EBA-4CFF-AA71-E6A499ABD6AF}" dt="2023-10-20T18:42:42.018" v="0"/>
+        <pc:chgData name="Goodman, Daniel F M" userId="3856083d-7deb-434e-baee-35426c02f58e" providerId="ADAL" clId="{0E69344F-9CC6-4F12-9DD7-79618EFB4DB5}" dt="2023-12-12T18:25:37.192" v="0"/>
         <pc:sldMkLst>
           <pc:docMk/>
           <pc:sldMk cId="2324049996" sldId="256"/>
         </pc:sldMkLst>
         <pc:picChg chg="mod">
-          <ac:chgData name="Goodman, Daniel F M" userId="3856083d-7deb-434e-baee-35426c02f58e" providerId="ADAL" clId="{B4BD21C8-3EBA-4CFF-AA71-E6A499ABD6AF}" dt="2023-10-20T18:42:42.018" v="0"/>
+          <ac:chgData name="Goodman, Daniel F M" userId="3856083d-7deb-434e-baee-35426c02f58e" providerId="ADAL" clId="{0E69344F-9CC6-4F12-9DD7-79618EFB4DB5}" dt="2023-12-12T18:25:37.192" v="0"/>
           <ac:picMkLst>
             <pc:docMk/>
             <pc:sldMk cId="2324049996" sldId="256"/>
@@ -424,13 +423,13 @@
         </pc:picChg>
       </pc:sldChg>
       <pc:sldChg chg="modSp modTransition modAnim">
-        <pc:chgData name="Goodman, Daniel F M" userId="3856083d-7deb-434e-baee-35426c02f58e" providerId="ADAL" clId="{B4BD21C8-3EBA-4CFF-AA71-E6A499ABD6AF}" dt="2023-10-20T18:42:42.018" v="0"/>
+        <pc:chgData name="Goodman, Daniel F M" userId="3856083d-7deb-434e-baee-35426c02f58e" providerId="ADAL" clId="{0E69344F-9CC6-4F12-9DD7-79618EFB4DB5}" dt="2023-12-12T18:25:37.192" v="0"/>
         <pc:sldMkLst>
           <pc:docMk/>
           <pc:sldMk cId="2408901148" sldId="258"/>
         </pc:sldMkLst>
         <pc:picChg chg="mod">
-          <ac:chgData name="Goodman, Daniel F M" userId="3856083d-7deb-434e-baee-35426c02f58e" providerId="ADAL" clId="{B4BD21C8-3EBA-4CFF-AA71-E6A499ABD6AF}" dt="2023-10-20T18:42:42.018" v="0"/>
+          <ac:chgData name="Goodman, Daniel F M" userId="3856083d-7deb-434e-baee-35426c02f58e" providerId="ADAL" clId="{0E69344F-9CC6-4F12-9DD7-79618EFB4DB5}" dt="2023-12-12T18:25:37.192" v="0"/>
           <ac:picMkLst>
             <pc:docMk/>
             <pc:sldMk cId="2408901148" sldId="258"/>
@@ -439,13 +438,13 @@
         </pc:picChg>
       </pc:sldChg>
       <pc:sldChg chg="modSp modTransition modAnim">
-        <pc:chgData name="Goodman, Daniel F M" userId="3856083d-7deb-434e-baee-35426c02f58e" providerId="ADAL" clId="{B4BD21C8-3EBA-4CFF-AA71-E6A499ABD6AF}" dt="2023-10-20T18:42:42.018" v="0"/>
+        <pc:chgData name="Goodman, Daniel F M" userId="3856083d-7deb-434e-baee-35426c02f58e" providerId="ADAL" clId="{0E69344F-9CC6-4F12-9DD7-79618EFB4DB5}" dt="2023-12-12T18:25:37.192" v="0"/>
         <pc:sldMkLst>
           <pc:docMk/>
           <pc:sldMk cId="3045154656" sldId="260"/>
         </pc:sldMkLst>
         <pc:picChg chg="mod">
-          <ac:chgData name="Goodman, Daniel F M" userId="3856083d-7deb-434e-baee-35426c02f58e" providerId="ADAL" clId="{B4BD21C8-3EBA-4CFF-AA71-E6A499ABD6AF}" dt="2023-10-20T18:42:42.018" v="0"/>
+          <ac:chgData name="Goodman, Daniel F M" userId="3856083d-7deb-434e-baee-35426c02f58e" providerId="ADAL" clId="{0E69344F-9CC6-4F12-9DD7-79618EFB4DB5}" dt="2023-12-12T18:25:37.192" v="0"/>
           <ac:picMkLst>
             <pc:docMk/>
             <pc:sldMk cId="3045154656" sldId="260"/>
@@ -454,13 +453,13 @@
         </pc:picChg>
       </pc:sldChg>
       <pc:sldChg chg="modSp modTransition modAnim">
-        <pc:chgData name="Goodman, Daniel F M" userId="3856083d-7deb-434e-baee-35426c02f58e" providerId="ADAL" clId="{B4BD21C8-3EBA-4CFF-AA71-E6A499ABD6AF}" dt="2023-10-20T18:42:42.018" v="0"/>
+        <pc:chgData name="Goodman, Daniel F M" userId="3856083d-7deb-434e-baee-35426c02f58e" providerId="ADAL" clId="{0E69344F-9CC6-4F12-9DD7-79618EFB4DB5}" dt="2023-12-12T18:25:37.192" v="0"/>
         <pc:sldMkLst>
           <pc:docMk/>
           <pc:sldMk cId="4284064043" sldId="261"/>
         </pc:sldMkLst>
         <pc:picChg chg="mod">
-          <ac:chgData name="Goodman, Daniel F M" userId="3856083d-7deb-434e-baee-35426c02f58e" providerId="ADAL" clId="{B4BD21C8-3EBA-4CFF-AA71-E6A499ABD6AF}" dt="2023-10-20T18:42:42.018" v="0"/>
+          <ac:chgData name="Goodman, Daniel F M" userId="3856083d-7deb-434e-baee-35426c02f58e" providerId="ADAL" clId="{0E69344F-9CC6-4F12-9DD7-79618EFB4DB5}" dt="2023-12-12T18:25:37.192" v="0"/>
           <ac:picMkLst>
             <pc:docMk/>
             <pc:sldMk cId="4284064043" sldId="261"/>
@@ -469,13 +468,13 @@
         </pc:picChg>
       </pc:sldChg>
       <pc:sldChg chg="modSp modTransition modAnim">
-        <pc:chgData name="Goodman, Daniel F M" userId="3856083d-7deb-434e-baee-35426c02f58e" providerId="ADAL" clId="{B4BD21C8-3EBA-4CFF-AA71-E6A499ABD6AF}" dt="2023-10-20T18:42:42.018" v="0"/>
+        <pc:chgData name="Goodman, Daniel F M" userId="3856083d-7deb-434e-baee-35426c02f58e" providerId="ADAL" clId="{0E69344F-9CC6-4F12-9DD7-79618EFB4DB5}" dt="2023-12-12T18:25:37.192" v="0"/>
         <pc:sldMkLst>
           <pc:docMk/>
           <pc:sldMk cId="4291910145" sldId="262"/>
         </pc:sldMkLst>
         <pc:picChg chg="mod">
-          <ac:chgData name="Goodman, Daniel F M" userId="3856083d-7deb-434e-baee-35426c02f58e" providerId="ADAL" clId="{B4BD21C8-3EBA-4CFF-AA71-E6A499ABD6AF}" dt="2023-10-20T18:42:42.018" v="0"/>
+          <ac:chgData name="Goodman, Daniel F M" userId="3856083d-7deb-434e-baee-35426c02f58e" providerId="ADAL" clId="{0E69344F-9CC6-4F12-9DD7-79618EFB4DB5}" dt="2023-12-12T18:25:37.192" v="0"/>
           <ac:picMkLst>
             <pc:docMk/>
             <pc:sldMk cId="4291910145" sldId="262"/>
@@ -484,13 +483,13 @@
         </pc:picChg>
       </pc:sldChg>
       <pc:sldChg chg="modSp modTransition modAnim">
-        <pc:chgData name="Goodman, Daniel F M" userId="3856083d-7deb-434e-baee-35426c02f58e" providerId="ADAL" clId="{B4BD21C8-3EBA-4CFF-AA71-E6A499ABD6AF}" dt="2023-10-20T18:42:42.018" v="0"/>
+        <pc:chgData name="Goodman, Daniel F M" userId="3856083d-7deb-434e-baee-35426c02f58e" providerId="ADAL" clId="{0E69344F-9CC6-4F12-9DD7-79618EFB4DB5}" dt="2023-12-12T18:25:37.192" v="0"/>
         <pc:sldMkLst>
           <pc:docMk/>
           <pc:sldMk cId="2756990299" sldId="263"/>
         </pc:sldMkLst>
         <pc:picChg chg="mod">
-          <ac:chgData name="Goodman, Daniel F M" userId="3856083d-7deb-434e-baee-35426c02f58e" providerId="ADAL" clId="{B4BD21C8-3EBA-4CFF-AA71-E6A499ABD6AF}" dt="2023-10-20T18:42:42.018" v="0"/>
+          <ac:chgData name="Goodman, Daniel F M" userId="3856083d-7deb-434e-baee-35426c02f58e" providerId="ADAL" clId="{0E69344F-9CC6-4F12-9DD7-79618EFB4DB5}" dt="2023-12-12T18:25:37.192" v="0"/>
           <ac:picMkLst>
             <pc:docMk/>
             <pc:sldMk cId="2756990299" sldId="263"/>
@@ -499,13 +498,13 @@
         </pc:picChg>
       </pc:sldChg>
       <pc:sldChg chg="modSp modTransition modAnim">
-        <pc:chgData name="Goodman, Daniel F M" userId="3856083d-7deb-434e-baee-35426c02f58e" providerId="ADAL" clId="{B4BD21C8-3EBA-4CFF-AA71-E6A499ABD6AF}" dt="2023-10-20T18:42:42.018" v="0"/>
+        <pc:chgData name="Goodman, Daniel F M" userId="3856083d-7deb-434e-baee-35426c02f58e" providerId="ADAL" clId="{0E69344F-9CC6-4F12-9DD7-79618EFB4DB5}" dt="2023-12-12T18:25:37.192" v="0"/>
         <pc:sldMkLst>
           <pc:docMk/>
           <pc:sldMk cId="3144186752" sldId="266"/>
         </pc:sldMkLst>
         <pc:picChg chg="mod">
-          <ac:chgData name="Goodman, Daniel F M" userId="3856083d-7deb-434e-baee-35426c02f58e" providerId="ADAL" clId="{B4BD21C8-3EBA-4CFF-AA71-E6A499ABD6AF}" dt="2023-10-20T18:42:42.018" v="0"/>
+          <ac:chgData name="Goodman, Daniel F M" userId="3856083d-7deb-434e-baee-35426c02f58e" providerId="ADAL" clId="{0E69344F-9CC6-4F12-9DD7-79618EFB4DB5}" dt="2023-12-12T18:25:37.192" v="0"/>
           <ac:picMkLst>
             <pc:docMk/>
             <pc:sldMk cId="3144186752" sldId="266"/>
@@ -1966,6 +1965,62 @@
             <ac:cxnSpMk id="62" creationId="{FF59EFE4-44CA-B06C-3A39-6E7EA600AA43}"/>
           </ac:cxnSpMkLst>
         </pc:cxnChg>
+      </pc:sldChg>
+    </pc:docChg>
+  </pc:docChgLst>
+  <pc:docChgLst>
+    <pc:chgData name="Goodman, Daniel F M" userId="3856083d-7deb-434e-baee-35426c02f58e" providerId="ADAL" clId="{30B316B2-9B78-472A-B53B-D93AFCF68998}"/>
+    <pc:docChg chg="modSld">
+      <pc:chgData name="Goodman, Daniel F M" userId="3856083d-7deb-434e-baee-35426c02f58e" providerId="ADAL" clId="{30B316B2-9B78-472A-B53B-D93AFCF68998}" dt="2023-12-12T18:19:49.085" v="17" actId="20577"/>
+      <pc:docMkLst>
+        <pc:docMk/>
+      </pc:docMkLst>
+      <pc:sldChg chg="modSp">
+        <pc:chgData name="Goodman, Daniel F M" userId="3856083d-7deb-434e-baee-35426c02f58e" providerId="ADAL" clId="{30B316B2-9B78-472A-B53B-D93AFCF68998}" dt="2023-12-12T18:19:49.085" v="17" actId="20577"/>
+        <pc:sldMkLst>
+          <pc:docMk/>
+          <pc:sldMk cId="2408901148" sldId="258"/>
+        </pc:sldMkLst>
+        <pc:spChg chg="mod">
+          <ac:chgData name="Goodman, Daniel F M" userId="3856083d-7deb-434e-baee-35426c02f58e" providerId="ADAL" clId="{30B316B2-9B78-472A-B53B-D93AFCF68998}" dt="2023-12-12T18:19:48.717" v="16" actId="20577"/>
+          <ac:spMkLst>
+            <pc:docMk/>
+            <pc:sldMk cId="2408901148" sldId="258"/>
+            <ac:spMk id="8" creationId="{DEC5FF3B-0692-63E4-4AD1-05543BCFB401}"/>
+          </ac:spMkLst>
+        </pc:spChg>
+        <pc:spChg chg="mod">
+          <ac:chgData name="Goodman, Daniel F M" userId="3856083d-7deb-434e-baee-35426c02f58e" providerId="ADAL" clId="{30B316B2-9B78-472A-B53B-D93AFCF68998}" dt="2023-12-12T18:19:48.717" v="16" actId="20577"/>
+          <ac:spMkLst>
+            <pc:docMk/>
+            <pc:sldMk cId="2408901148" sldId="258"/>
+            <ac:spMk id="9" creationId="{2266009C-2739-415C-75CB-A15782FB6678}"/>
+          </ac:spMkLst>
+        </pc:spChg>
+        <pc:spChg chg="mod">
+          <ac:chgData name="Goodman, Daniel F M" userId="3856083d-7deb-434e-baee-35426c02f58e" providerId="ADAL" clId="{30B316B2-9B78-472A-B53B-D93AFCF68998}" dt="2023-12-12T18:19:49.085" v="17" actId="20577"/>
+          <ac:spMkLst>
+            <pc:docMk/>
+            <pc:sldMk cId="2408901148" sldId="258"/>
+            <ac:spMk id="10" creationId="{CA0E427E-887E-2C2A-671D-4639694C9CB4}"/>
+          </ac:spMkLst>
+        </pc:spChg>
+        <pc:spChg chg="mod">
+          <ac:chgData name="Goodman, Daniel F M" userId="3856083d-7deb-434e-baee-35426c02f58e" providerId="ADAL" clId="{30B316B2-9B78-472A-B53B-D93AFCF68998}" dt="2023-12-12T18:19:48.717" v="16" actId="20577"/>
+          <ac:spMkLst>
+            <pc:docMk/>
+            <pc:sldMk cId="2408901148" sldId="258"/>
+            <ac:spMk id="11" creationId="{5CE87A5B-338E-7980-A478-AF317586D421}"/>
+          </ac:spMkLst>
+        </pc:spChg>
+        <pc:grpChg chg="mod">
+          <ac:chgData name="Goodman, Daniel F M" userId="3856083d-7deb-434e-baee-35426c02f58e" providerId="ADAL" clId="{30B316B2-9B78-472A-B53B-D93AFCF68998}" dt="2023-12-12T18:19:48.717" v="16" actId="20577"/>
+          <ac:grpSpMkLst>
+            <pc:docMk/>
+            <pc:sldMk cId="2408901148" sldId="258"/>
+            <ac:grpSpMk id="5" creationId="{7AF0E1CF-118B-3B0A-93B6-3B574CBA5863}"/>
+          </ac:grpSpMkLst>
+        </pc:grpChg>
       </pc:sldChg>
     </pc:docChg>
   </pc:docChgLst>
@@ -2066,7 +2121,7 @@
           <a:p>
             <a:fld id="{B159EE65-08E4-4261-BBCA-E58E60523EF6}" type="datetimeFigureOut">
               <a:rPr lang="en-GB" smtClean="0"/>
-              <a:t>20/10/2023</a:t>
+              <a:t>12/12/2023</a:t>
             </a:fld>
             <a:endParaRPr lang="en-GB"/>
           </a:p>
@@ -2243,7 +2298,7 @@
           <a:p>
             <a:fld id="{1734529B-0594-4F93-84B7-BCB7DA1276A3}" type="datetimeFigureOut">
               <a:rPr lang="en-GB" smtClean="0"/>
-              <a:t>20/10/2023</a:t>
+              <a:t>12/12/2023</a:t>
             </a:fld>
             <a:endParaRPr lang="en-GB"/>
           </a:p>
@@ -4034,7 +4089,7 @@
           <a:p>
             <a:fld id="{85228B17-9E99-45ED-9028-28A80E2F7F94}" type="datetimeFigureOut">
               <a:rPr lang="en-GB" smtClean="0"/>
-              <a:t>20/10/2023</a:t>
+              <a:t>12/12/2023</a:t>
             </a:fld>
             <a:endParaRPr lang="en-GB"/>
           </a:p>
@@ -4214,7 +4269,7 @@
           <a:p>
             <a:fld id="{85228B17-9E99-45ED-9028-28A80E2F7F94}" type="datetimeFigureOut">
               <a:rPr lang="en-GB" smtClean="0"/>
-              <a:t>20/10/2023</a:t>
+              <a:t>12/12/2023</a:t>
             </a:fld>
             <a:endParaRPr lang="en-GB"/>
           </a:p>
@@ -4602,7 +4657,7 @@
           <a:p>
             <a:fld id="{85228B17-9E99-45ED-9028-28A80E2F7F94}" type="datetimeFigureOut">
               <a:rPr lang="en-GB" smtClean="0"/>
-              <a:t>20/10/2023</a:t>
+              <a:t>12/12/2023</a:t>
             </a:fld>
             <a:endParaRPr lang="en-GB"/>
           </a:p>
@@ -4834,7 +4889,7 @@
           <a:p>
             <a:fld id="{85228B17-9E99-45ED-9028-28A80E2F7F94}" type="datetimeFigureOut">
               <a:rPr lang="en-GB" smtClean="0"/>
-              <a:t>20/10/2023</a:t>
+              <a:t>12/12/2023</a:t>
             </a:fld>
             <a:endParaRPr lang="en-GB"/>
           </a:p>
@@ -5201,7 +5256,7 @@
           <a:p>
             <a:fld id="{85228B17-9E99-45ED-9028-28A80E2F7F94}" type="datetimeFigureOut">
               <a:rPr lang="en-GB" smtClean="0"/>
-              <a:t>20/10/2023</a:t>
+              <a:t>12/12/2023</a:t>
             </a:fld>
             <a:endParaRPr lang="en-GB"/>
           </a:p>
@@ -5319,7 +5374,7 @@
           <a:p>
             <a:fld id="{85228B17-9E99-45ED-9028-28A80E2F7F94}" type="datetimeFigureOut">
               <a:rPr lang="en-GB" smtClean="0"/>
-              <a:t>20/10/2023</a:t>
+              <a:t>12/12/2023</a:t>
             </a:fld>
             <a:endParaRPr lang="en-GB"/>
           </a:p>
@@ -5414,7 +5469,7 @@
           <a:p>
             <a:fld id="{85228B17-9E99-45ED-9028-28A80E2F7F94}" type="datetimeFigureOut">
               <a:rPr lang="en-GB" smtClean="0"/>
-              <a:t>20/10/2023</a:t>
+              <a:t>12/12/2023</a:t>
             </a:fld>
             <a:endParaRPr lang="en-GB"/>
           </a:p>
@@ -5691,7 +5746,7 @@
           <a:p>
             <a:fld id="{85228B17-9E99-45ED-9028-28A80E2F7F94}" type="datetimeFigureOut">
               <a:rPr lang="en-GB" smtClean="0"/>
-              <a:t>20/10/2023</a:t>
+              <a:t>12/12/2023</a:t>
             </a:fld>
             <a:endParaRPr lang="en-GB"/>
           </a:p>
@@ -5948,7 +6003,7 @@
           <a:p>
             <a:fld id="{85228B17-9E99-45ED-9028-28A80E2F7F94}" type="datetimeFigureOut">
               <a:rPr lang="en-GB" smtClean="0"/>
-              <a:t>20/10/2023</a:t>
+              <a:t>12/12/2023</a:t>
             </a:fld>
             <a:endParaRPr lang="en-GB"/>
           </a:p>
@@ -6161,7 +6216,7 @@
           <a:p>
             <a:fld id="{85228B17-9E99-45ED-9028-28A80E2F7F94}" type="datetimeFigureOut">
               <a:rPr lang="en-GB" smtClean="0"/>
-              <a:t>20/10/2023</a:t>
+              <a:t>12/12/2023</a:t>
             </a:fld>
             <a:endParaRPr lang="en-GB"/>
           </a:p>
@@ -10172,12 +10227,31 @@
                           </a:rPr>
                           <m:t>𝜏</m:t>
                         </m:r>
-                        <m:r>
-                          <a:rPr lang="en-GB" sz="2000" b="0" i="1" smtClean="0">
-                            <a:latin typeface="Cambria Math" panose="02040503050406030204" pitchFamily="18" charset="0"/>
-                          </a:rPr>
-                          <m:t>𝑥</m:t>
-                        </m:r>
+                        <m:sSup>
+                          <m:sSupPr>
+                            <m:ctrlPr>
+                              <a:rPr lang="en-GB" sz="2000" b="0" i="1" smtClean="0">
+                                <a:latin typeface="Cambria Math" panose="02040503050406030204" pitchFamily="18" charset="0"/>
+                              </a:rPr>
+                            </m:ctrlPr>
+                          </m:sSupPr>
+                          <m:e>
+                            <m:r>
+                              <a:rPr lang="en-GB" sz="2000" b="0" i="1" smtClean="0">
+                                <a:latin typeface="Cambria Math" panose="02040503050406030204" pitchFamily="18" charset="0"/>
+                              </a:rPr>
+                              <m:t>𝑥</m:t>
+                            </m:r>
+                          </m:e>
+                          <m:sup>
+                            <m:r>
+                              <a:rPr lang="en-GB" sz="2000" b="0" i="1" smtClean="0">
+                                <a:latin typeface="Cambria Math" panose="02040503050406030204" pitchFamily="18" charset="0"/>
+                              </a:rPr>
+                              <m:t>′</m:t>
+                            </m:r>
+                          </m:sup>
+                        </m:sSup>
                         <m:r>
                           <a:rPr lang="en-GB" sz="2000" b="0" i="1" smtClean="0">
                             <a:latin typeface="Cambria Math" panose="02040503050406030204" pitchFamily="18" charset="0"/>
@@ -10415,12 +10489,31 @@
                             </m:r>
                           </m:sub>
                         </m:sSub>
-                        <m:r>
-                          <a:rPr lang="en-GB" sz="2000" b="0" i="1" smtClean="0">
-                            <a:latin typeface="Cambria Math" panose="02040503050406030204" pitchFamily="18" charset="0"/>
-                          </a:rPr>
-                          <m:t>𝑥</m:t>
-                        </m:r>
+                        <m:sSup>
+                          <m:sSupPr>
+                            <m:ctrlPr>
+                              <a:rPr lang="en-GB" sz="2000" b="0" i="1" smtClean="0">
+                                <a:latin typeface="Cambria Math" panose="02040503050406030204" pitchFamily="18" charset="0"/>
+                              </a:rPr>
+                            </m:ctrlPr>
+                          </m:sSupPr>
+                          <m:e>
+                            <m:r>
+                              <a:rPr lang="en-GB" sz="2000" b="0" i="1" smtClean="0">
+                                <a:latin typeface="Cambria Math" panose="02040503050406030204" pitchFamily="18" charset="0"/>
+                              </a:rPr>
+                              <m:t>𝑥</m:t>
+                            </m:r>
+                          </m:e>
+                          <m:sup>
+                            <m:r>
+                              <a:rPr lang="en-GB" sz="2000" b="0" i="1" smtClean="0">
+                                <a:latin typeface="Cambria Math" panose="02040503050406030204" pitchFamily="18" charset="0"/>
+                              </a:rPr>
+                              <m:t>′</m:t>
+                            </m:r>
+                          </m:sup>
+                        </m:sSup>
                         <m:r>
                           <a:rPr lang="en-GB" sz="2000" b="0" i="1" smtClean="0">
                             <a:latin typeface="Cambria Math" panose="02040503050406030204" pitchFamily="18" charset="0"/>

</xml_diff>